<commit_message>
cancel and resale item
</commit_message>
<xml_diff>
--- a/Blockchain1.pptx
+++ b/Blockchain1.pptx
@@ -211,7 +211,7 @@
           <a:p>
             <a:fld id="{FA90EC1C-D305-4D94-A551-D43A0AC1DF1E}" type="datetimeFigureOut">
               <a:rPr lang="en-US" smtClean="0"/>
-              <a:t>27 Dec 2021</a:t>
+              <a:t>14 Feb 2022</a:t>
             </a:fld>
             <a:endParaRPr lang="en-US"/>
           </a:p>
@@ -7944,7 +7944,7 @@
         </p:nvGrpSpPr>
         <p:grpSpPr>
           <a:xfrm>
-            <a:off x="3457412" y="1660987"/>
+            <a:off x="3419872" y="1808821"/>
             <a:ext cx="5328592" cy="755937"/>
             <a:chOff x="3414539" y="1203598"/>
             <a:chExt cx="5328592" cy="755937"/>
@@ -8249,7 +8249,7 @@
         </p:nvGrpSpPr>
         <p:grpSpPr>
           <a:xfrm>
-            <a:off x="3099149" y="2569260"/>
+            <a:off x="3061609" y="2717094"/>
             <a:ext cx="5328592" cy="755937"/>
             <a:chOff x="3414539" y="1203598"/>
             <a:chExt cx="5328592" cy="755937"/>
@@ -8554,7 +8554,7 @@
         </p:nvGrpSpPr>
         <p:grpSpPr>
           <a:xfrm>
-            <a:off x="2740887" y="3477533"/>
+            <a:off x="2703347" y="3625367"/>
             <a:ext cx="5328592" cy="755937"/>
             <a:chOff x="3414539" y="1203598"/>
             <a:chExt cx="5328592" cy="755937"/>
@@ -8859,7 +8859,7 @@
         </p:nvSpPr>
         <p:spPr>
           <a:xfrm>
-            <a:off x="3672786" y="1718154"/>
+            <a:off x="3635246" y="1865988"/>
             <a:ext cx="608526" cy="461665"/>
           </a:xfrm>
           <a:prstGeom prst="rect">
@@ -8900,7 +8900,7 @@
         </p:nvSpPr>
         <p:spPr>
           <a:xfrm>
-            <a:off x="3319794" y="2626427"/>
+            <a:off x="3282254" y="2774261"/>
             <a:ext cx="608526" cy="461665"/>
           </a:xfrm>
           <a:prstGeom prst="rect">
@@ -8941,7 +8941,7 @@
         </p:nvSpPr>
         <p:spPr>
           <a:xfrm>
-            <a:off x="2966803" y="3534700"/>
+            <a:off x="2929263" y="3682534"/>
             <a:ext cx="608526" cy="461665"/>
           </a:xfrm>
           <a:prstGeom prst="rect">
@@ -8982,10 +8982,10 @@
         </p:nvGrpSpPr>
         <p:grpSpPr>
           <a:xfrm>
-            <a:off x="4496686" y="1847198"/>
-            <a:ext cx="4296006" cy="533606"/>
-            <a:chOff x="4593681" y="1245639"/>
-            <a:chExt cx="3947407" cy="533606"/>
+            <a:off x="4447323" y="1995032"/>
+            <a:ext cx="4296006" cy="552577"/>
+            <a:chOff x="4582817" y="1245639"/>
+            <a:chExt cx="3947407" cy="552577"/>
           </a:xfrm>
         </p:grpSpPr>
         <p:sp>
@@ -8996,7 +8996,7 @@
           </p:nvSpPr>
           <p:spPr>
             <a:xfrm>
-              <a:off x="4593681" y="1533024"/>
+              <a:off x="4582817" y="1551995"/>
               <a:ext cx="3947407" cy="246221"/>
             </a:xfrm>
             <a:prstGeom prst="rect">
@@ -9020,9 +9020,33 @@
                   </a:solidFill>
                   <a:cs typeface="Arial" pitchFamily="34" charset="0"/>
                 </a:rPr>
-                <a:t>Phải dùng bằng wei, không tiện cho việc nhập giá</a:t>
+                <a:t>Ai cũng có thể đăng bán và </a:t>
               </a:r>
-              <a:endParaRPr lang="en-US" altLang="ko-KR" sz="1000" dirty="0">
+              <a:r>
+                <a:rPr lang="vi-VN" altLang="ko-KR" sz="1000" smtClean="0">
+                  <a:solidFill>
+                    <a:schemeClr val="tx1">
+                      <a:lumMod val="75000"/>
+                      <a:lumOff val="25000"/>
+                    </a:schemeClr>
+                  </a:solidFill>
+                  <a:cs typeface="Arial" pitchFamily="34" charset="0"/>
+                </a:rPr>
+                <a:t>mua </a:t>
+              </a:r>
+              <a:r>
+                <a:rPr lang="vi-VN" altLang="ko-KR" sz="1000">
+                  <a:solidFill>
+                    <a:schemeClr val="tx1">
+                      <a:lumMod val="75000"/>
+                      <a:lumOff val="25000"/>
+                    </a:schemeClr>
+                  </a:solidFill>
+                  <a:cs typeface="Arial" pitchFamily="34" charset="0"/>
+                </a:rPr>
+                <a:t>hàng, tiền trả về người bán</a:t>
+              </a:r>
+              <a:endParaRPr lang="en-US" altLang="ko-KR" sz="1000" smtClean="0">
                 <a:solidFill>
                   <a:schemeClr val="tx1">
                     <a:lumMod val="75000"/>
@@ -9066,7 +9090,7 @@
                   </a:solidFill>
                   <a:cs typeface="Arial" pitchFamily="34" charset="0"/>
                 </a:rPr>
-                <a:t>Tạo item</a:t>
+                <a:t>ItemManager </a:t>
               </a:r>
               <a:endParaRPr lang="ko-KR" altLang="en-US" sz="1400" b="1" dirty="0">
                 <a:solidFill>
@@ -9089,10 +9113,10 @@
         </p:nvGrpSpPr>
         <p:grpSpPr>
           <a:xfrm>
-            <a:off x="4163162" y="2761625"/>
-            <a:ext cx="4212493" cy="534679"/>
-            <a:chOff x="4618459" y="1248519"/>
-            <a:chExt cx="3716924" cy="534679"/>
+            <a:off x="4083858" y="2909459"/>
+            <a:ext cx="4254256" cy="525829"/>
+            <a:chOff x="4581609" y="1248519"/>
+            <a:chExt cx="3753774" cy="525829"/>
           </a:xfrm>
         </p:grpSpPr>
         <p:sp>
@@ -9103,7 +9127,7 @@
           </p:nvSpPr>
           <p:spPr>
             <a:xfrm>
-              <a:off x="4618459" y="1536977"/>
+              <a:off x="4581609" y="1528127"/>
               <a:ext cx="3716924" cy="246221"/>
             </a:xfrm>
             <a:prstGeom prst="rect">
@@ -9124,7 +9148,7 @@
                   </a:solidFill>
                   <a:cs typeface="Arial" pitchFamily="34" charset="0"/>
                 </a:rPr>
-                <a:t>Chưa có phần quản lý các item bằng giao diện người dùng.</a:t>
+                <a:t>Owner có nhiều quyền quản lý Item hơn, thêm hóa đơn sau khi bán </a:t>
               </a:r>
               <a:endParaRPr lang="en-US" altLang="ko-KR" sz="1000" dirty="0">
                 <a:solidFill>
@@ -9167,7 +9191,7 @@
                   </a:solidFill>
                   <a:cs typeface="Arial" pitchFamily="34" charset="0"/>
                 </a:rPr>
-                <a:t>Quản lý items</a:t>
+                <a:t>Item</a:t>
               </a:r>
               <a:endParaRPr lang="ko-KR" altLang="en-US" sz="1200" b="1" dirty="0">
                 <a:solidFill>
@@ -9190,10 +9214,10 @@
         </p:nvGrpSpPr>
         <p:grpSpPr>
           <a:xfrm>
-            <a:off x="3782474" y="3668393"/>
-            <a:ext cx="4294738" cy="536633"/>
-            <a:chOff x="4600724" y="1243740"/>
-            <a:chExt cx="3787604" cy="536633"/>
+            <a:off x="3753185" y="3816227"/>
+            <a:ext cx="4294738" cy="519237"/>
+            <a:chOff x="4608001" y="1243740"/>
+            <a:chExt cx="3787604" cy="519237"/>
           </a:xfrm>
         </p:grpSpPr>
         <p:sp>
@@ -9204,7 +9228,7 @@
           </p:nvSpPr>
           <p:spPr>
             <a:xfrm>
-              <a:off x="4600724" y="1534152"/>
+              <a:off x="4608001" y="1516756"/>
               <a:ext cx="3787604" cy="246221"/>
             </a:xfrm>
             <a:prstGeom prst="rect">
@@ -9228,7 +9252,7 @@
                   </a:solidFill>
                   <a:cs typeface="Arial" pitchFamily="34" charset="0"/>
                 </a:rPr>
-                <a:t>Mua item phải mất công đi nhập địa chỉ</a:t>
+                <a:t>Vận đơn của Item, quản lý vận chuyển, thời gian thực hiện, hoàn tiền </a:t>
               </a:r>
               <a:endParaRPr lang="en-US" altLang="ko-KR" sz="1000" dirty="0">
                 <a:solidFill>
@@ -9271,7 +9295,7 @@
                   </a:solidFill>
                   <a:cs typeface="Arial" pitchFamily="34" charset="0"/>
                 </a:rPr>
-                <a:t>Mua item</a:t>
+                <a:t>Order</a:t>
               </a:r>
               <a:endParaRPr lang="ko-KR" altLang="en-US" sz="1400" b="1" dirty="0">
                 <a:solidFill>
@@ -9286,6 +9310,80 @@
           </p:txBody>
         </p:sp>
       </p:grpSp>
+      <p:sp>
+        <p:nvSpPr>
+          <p:cNvPr id="6" name="Hộp Văn bản 5"/>
+          <p:cNvSpPr txBox="1"/>
+          <p:nvPr/>
+        </p:nvSpPr>
+        <p:spPr>
+          <a:xfrm>
+            <a:off x="4649099" y="1204434"/>
+            <a:ext cx="3166563" cy="307777"/>
+          </a:xfrm>
+          <a:prstGeom prst="rect">
+            <a:avLst/>
+          </a:prstGeom>
+          <a:noFill/>
+        </p:spPr>
+        <p:txBody>
+          <a:bodyPr wrap="square" rtlCol="0">
+            <a:spAutoFit/>
+          </a:bodyPr>
+          <a:lstStyle/>
+          <a:p>
+            <a:r>
+              <a:rPr lang="en-US" sz="1400" i="1" u="sng" smtClean="0">
+                <a:solidFill>
+                  <a:schemeClr val="accent4">
+                    <a:lumMod val="40000"/>
+                    <a:lumOff val="60000"/>
+                  </a:schemeClr>
+                </a:solidFill>
+                <a:latin typeface="Segoe UI Semibold" panose="020B0702040204020203" pitchFamily="34" charset="0"/>
+                <a:cs typeface="Segoe UI Semibold" panose="020B0702040204020203" pitchFamily="34" charset="0"/>
+              </a:rPr>
+              <a:t>_</a:t>
+            </a:r>
+            <a:r>
+              <a:rPr lang="en-US" sz="1400" i="1" u="sng">
+                <a:solidFill>
+                  <a:schemeClr val="accent4">
+                    <a:lumMod val="40000"/>
+                    <a:lumOff val="60000"/>
+                  </a:schemeClr>
+                </a:solidFill>
+                <a:latin typeface="Segoe UI Semibold" panose="020B0702040204020203" pitchFamily="34" charset="0"/>
+                <a:cs typeface="Segoe UI Semibold" panose="020B0702040204020203" pitchFamily="34" charset="0"/>
+              </a:rPr>
+              <a:t>s</a:t>
+            </a:r>
+            <a:r>
+              <a:rPr lang="en-US" sz="1400" i="1" u="sng" smtClean="0">
+                <a:solidFill>
+                  <a:schemeClr val="accent4">
+                    <a:lumMod val="40000"/>
+                    <a:lumOff val="60000"/>
+                  </a:schemeClr>
+                </a:solidFill>
+                <a:latin typeface="Segoe UI Semibold" panose="020B0702040204020203" pitchFamily="34" charset="0"/>
+                <a:cs typeface="Segoe UI Semibold" panose="020B0702040204020203" pitchFamily="34" charset="0"/>
+              </a:rPr>
+              <a:t>mart contract only_</a:t>
+            </a:r>
+            <a:endParaRPr lang="en-US" sz="1400" i="1" u="sng">
+              <a:solidFill>
+                <a:schemeClr val="accent4">
+                  <a:lumMod val="40000"/>
+                  <a:lumOff val="60000"/>
+                </a:schemeClr>
+              </a:solidFill>
+              <a:latin typeface="Segoe UI Semibold" panose="020B0702040204020203" pitchFamily="34" charset="0"/>
+              <a:cs typeface="Segoe UI Semibold" panose="020B0702040204020203" pitchFamily="34" charset="0"/>
+            </a:endParaRPr>
+          </a:p>
+        </p:txBody>
+      </p:sp>
     </p:spTree>
     <p:extLst>
       <p:ext uri="{BB962C8B-B14F-4D97-AF65-F5344CB8AC3E}">
@@ -9343,7 +9441,7 @@
         </p:nvSpPr>
         <p:spPr>
           <a:xfrm>
-            <a:off x="1403648" y="555526"/>
+            <a:off x="1259632" y="195486"/>
             <a:ext cx="6408712" cy="576064"/>
           </a:xfrm>
         </p:spPr>
@@ -9377,14 +9475,14 @@
           <p:nvPr>
             <p:extLst>
               <p:ext uri="{D42A27DB-BD31-4B8C-83A1-F6EECF244321}">
-                <p14:modId xmlns:p14="http://schemas.microsoft.com/office/powerpoint/2010/main" val="182055167"/>
+                <p14:modId xmlns:p14="http://schemas.microsoft.com/office/powerpoint/2010/main" val="1664880761"/>
               </p:ext>
             </p:extLst>
           </p:nvPr>
         </p:nvGraphicFramePr>
         <p:xfrm>
-          <a:off x="1583668" y="1707654"/>
-          <a:ext cx="6048672" cy="1255007"/>
+          <a:off x="755576" y="915566"/>
+          <a:ext cx="7632848" cy="3952487"/>
         </p:xfrm>
         <a:graphic>
           <a:graphicData uri="http://schemas.openxmlformats.org/drawingml/2006/table">
@@ -9393,8 +9491,8 @@
                 <a:tableStyleId>{5940675A-B579-460E-94D1-54222C63F5DA}</a:tableStyleId>
               </a:tblPr>
               <a:tblGrid>
-                <a:gridCol w="3024336"/>
-                <a:gridCol w="3024336"/>
+                <a:gridCol w="1260140"/>
+                <a:gridCol w="6372708"/>
               </a:tblGrid>
               <a:tr h="432047">
                 <a:tc>
@@ -9403,26 +9501,6 @@
                     <a:lstStyle/>
                     <a:p>
                       <a:pPr algn="l"/>
-                      <a:r>
-                        <a:rPr lang="en-US" sz="1400" b="1" smtClean="0">
-                          <a:solidFill>
-                            <a:schemeClr val="accent1"/>
-                          </a:solidFill>
-                          <a:latin typeface="+mj-lt"/>
-                          <a:cs typeface="Calibri" panose="020F0502020204030204" pitchFamily="34" charset="0"/>
-                        </a:rPr>
-                        <a:t>Chức</a:t>
-                      </a:r>
-                      <a:r>
-                        <a:rPr lang="en-US" sz="1400" b="1" baseline="0" smtClean="0">
-                          <a:solidFill>
-                            <a:schemeClr val="accent1"/>
-                          </a:solidFill>
-                          <a:latin typeface="+mj-lt"/>
-                          <a:cs typeface="Calibri" panose="020F0502020204030204" pitchFamily="34" charset="0"/>
-                        </a:rPr>
-                        <a:t> năng</a:t>
-                      </a:r>
                       <a:endParaRPr lang="en-US" sz="1400" b="1">
                         <a:solidFill>
                           <a:schemeClr val="accent1"/>
@@ -9434,9 +9512,7 @@
                   </a:txBody>
                   <a:tcPr anchor="ctr">
                     <a:lnL w="12700" cap="flat" cmpd="sng" algn="ctr">
-                      <a:solidFill>
-                        <a:schemeClr val="accent1"/>
-                      </a:solidFill>
+                      <a:noFill/>
                       <a:prstDash val="solid"/>
                       <a:round/>
                       <a:headEnd type="none" w="med" len="med"/>
@@ -9444,7 +9520,7 @@
                     </a:lnL>
                     <a:lnR w="12700" cap="flat" cmpd="sng" algn="ctr">
                       <a:solidFill>
-                        <a:schemeClr val="accent1"/>
+                        <a:schemeClr val="tx1"/>
                       </a:solidFill>
                       <a:prstDash val="solid"/>
                       <a:round/>
@@ -9452,9 +9528,7 @@
                       <a:tailEnd type="none" w="med" len="med"/>
                     </a:lnR>
                     <a:lnT w="12700" cap="flat" cmpd="sng" algn="ctr">
-                      <a:solidFill>
-                        <a:schemeClr val="accent1"/>
-                      </a:solidFill>
+                      <a:noFill/>
                       <a:prstDash val="solid"/>
                       <a:round/>
                       <a:headEnd type="none" w="med" len="med"/>
@@ -9462,13 +9536,21 @@
                     </a:lnT>
                     <a:lnB w="12700" cap="flat" cmpd="sng" algn="ctr">
                       <a:solidFill>
-                        <a:schemeClr val="accent1"/>
+                        <a:schemeClr val="tx1"/>
                       </a:solidFill>
                       <a:prstDash val="solid"/>
                       <a:round/>
                       <a:headEnd type="none" w="med" len="med"/>
                       <a:tailEnd type="none" w="med" len="med"/>
                     </a:lnB>
+                    <a:lnTlToBr w="12700" cmpd="sng">
+                      <a:noFill/>
+                      <a:prstDash val="solid"/>
+                    </a:lnTlToBr>
+                    <a:lnBlToTr w="12700" cmpd="sng">
+                      <a:noFill/>
+                      <a:prstDash val="solid"/>
+                    </a:lnBlToTr>
                   </a:tcPr>
                 </a:tc>
                 <a:tc>
@@ -9509,7 +9591,7 @@
                   <a:tcPr anchor="ctr">
                     <a:lnL w="12700" cap="flat" cmpd="sng" algn="ctr">
                       <a:solidFill>
-                        <a:schemeClr val="accent1"/>
+                        <a:schemeClr val="tx1"/>
                       </a:solidFill>
                       <a:prstDash val="solid"/>
                       <a:round/>
@@ -9517,18 +9599,14 @@
                       <a:tailEnd type="none" w="med" len="med"/>
                     </a:lnL>
                     <a:lnR w="12700" cap="flat" cmpd="sng" algn="ctr">
-                      <a:solidFill>
-                        <a:schemeClr val="accent1"/>
-                      </a:solidFill>
+                      <a:noFill/>
                       <a:prstDash val="solid"/>
                       <a:round/>
                       <a:headEnd type="none" w="med" len="med"/>
                       <a:tailEnd type="none" w="med" len="med"/>
                     </a:lnR>
                     <a:lnT w="12700" cap="flat" cmpd="sng" algn="ctr">
-                      <a:solidFill>
-                        <a:schemeClr val="accent1"/>
-                      </a:solidFill>
+                      <a:noFill/>
                       <a:prstDash val="solid"/>
                       <a:round/>
                       <a:headEnd type="none" w="med" len="med"/>
@@ -9536,22 +9614,31 @@
                     </a:lnT>
                     <a:lnB w="12700" cap="flat" cmpd="sng" algn="ctr">
                       <a:solidFill>
-                        <a:schemeClr val="accent1"/>
+                        <a:schemeClr val="tx1"/>
                       </a:solidFill>
                       <a:prstDash val="solid"/>
                       <a:round/>
                       <a:headEnd type="none" w="med" len="med"/>
                       <a:tailEnd type="none" w="med" len="med"/>
                     </a:lnB>
+                    <a:lnTlToBr w="12700" cmpd="sng">
+                      <a:noFill/>
+                      <a:prstDash val="solid"/>
+                    </a:lnTlToBr>
+                    <a:lnBlToTr w="12700" cmpd="sng">
+                      <a:noFill/>
+                      <a:prstDash val="solid"/>
+                    </a:lnBlToTr>
                   </a:tcPr>
                 </a:tc>
               </a:tr>
-              <a:tr h="133489">
+              <a:tr h="720081">
                 <a:tc>
                   <a:txBody>
                     <a:bodyPr/>
                     <a:lstStyle/>
                     <a:p>
+                      <a:pPr algn="ctr"/>
                       <a:r>
                         <a:rPr lang="en-US" sz="1100" b="1" kern="1200" smtClean="0">
                           <a:solidFill>
@@ -9562,7 +9649,7 @@
                           <a:ea typeface="+mn-ea"/>
                           <a:cs typeface="+mn-cs"/>
                         </a:rPr>
-                        <a:t>Create item</a:t>
+                        <a:t>Item</a:t>
                       </a:r>
                       <a:endParaRPr lang="en-US" sz="1100" smtClean="0">
                         <a:solidFill>
@@ -9575,9 +9662,7 @@
                   </a:txBody>
                   <a:tcPr anchor="ctr">
                     <a:lnL w="12700" cap="flat" cmpd="sng" algn="ctr">
-                      <a:solidFill>
-                        <a:schemeClr val="accent1"/>
-                      </a:solidFill>
+                      <a:noFill/>
                       <a:prstDash val="solid"/>
                       <a:round/>
                       <a:headEnd type="none" w="med" len="med"/>
@@ -9585,7 +9670,7 @@
                     </a:lnL>
                     <a:lnR w="12700" cap="flat" cmpd="sng" algn="ctr">
                       <a:solidFill>
-                        <a:schemeClr val="accent1"/>
+                        <a:schemeClr val="tx1"/>
                       </a:solidFill>
                       <a:prstDash val="solid"/>
                       <a:round/>
@@ -9594,7 +9679,7 @@
                     </a:lnR>
                     <a:lnT w="12700" cap="flat" cmpd="sng" algn="ctr">
                       <a:solidFill>
-                        <a:schemeClr val="accent1"/>
+                        <a:schemeClr val="tx1"/>
                       </a:solidFill>
                       <a:prstDash val="solid"/>
                       <a:round/>
@@ -9603,13 +9688,21 @@
                     </a:lnT>
                     <a:lnB w="12700" cap="flat" cmpd="sng" algn="ctr">
                       <a:solidFill>
-                        <a:schemeClr val="accent1"/>
+                        <a:schemeClr val="tx1"/>
                       </a:solidFill>
                       <a:prstDash val="solid"/>
                       <a:round/>
                       <a:headEnd type="none" w="med" len="med"/>
                       <a:tailEnd type="none" w="med" len="med"/>
                     </a:lnB>
+                    <a:lnTlToBr w="12700" cmpd="sng">
+                      <a:noFill/>
+                      <a:prstDash val="solid"/>
+                    </a:lnTlToBr>
+                    <a:lnBlToTr w="12700" cmpd="sng">
+                      <a:noFill/>
+                      <a:prstDash val="solid"/>
+                    </a:lnBlToTr>
                   </a:tcPr>
                 </a:tc>
                 <a:tc>
@@ -9617,8 +9710,24 @@
                     <a:bodyPr/>
                     <a:lstStyle/>
                     <a:p>
+                      <a:pPr>
+                        <a:spcBef>
+                          <a:spcPts val="0"/>
+                        </a:spcBef>
+                        <a:spcAft>
+                          <a:spcPts val="600"/>
+                        </a:spcAft>
+                      </a:pPr>
                       <a:r>
                         <a:rPr lang="en-US" sz="1200" smtClean="0">
+                          <a:solidFill>
+                            <a:schemeClr val="tx1"/>
+                          </a:solidFill>
+                        </a:rPr>
+                        <a:t>-</a:t>
+                      </a:r>
+                      <a:r>
+                        <a:rPr lang="en-US" sz="1200" baseline="0" smtClean="0">
                           <a:solidFill>
                             <a:schemeClr val="tx1"/>
                           </a:solidFill>
@@ -9626,13 +9735,92 @@
                         <a:t> </a:t>
                       </a:r>
                       <a:r>
+                        <a:rPr lang="en-US" sz="1200" smtClean="0">
+                          <a:solidFill>
+                            <a:schemeClr val="tx1"/>
+                          </a:solidFill>
+                        </a:rPr>
+                        <a:t>Lưu</a:t>
+                      </a:r>
+                      <a:r>
+                        <a:rPr lang="en-US" sz="1200" baseline="0" smtClean="0">
+                          <a:solidFill>
+                            <a:schemeClr val="tx1"/>
+                          </a:solidFill>
+                        </a:rPr>
+                        <a:t> thêm thông số kỹ thuật của Item và chuỗi hash của dữ liệu mở rộng.</a:t>
+                      </a:r>
+                    </a:p>
+                    <a:p>
+                      <a:pPr marL="0" indent="0">
+                        <a:spcBef>
+                          <a:spcPts val="0"/>
+                        </a:spcBef>
+                        <a:spcAft>
+                          <a:spcPts val="600"/>
+                        </a:spcAft>
+                        <a:buFontTx/>
+                        <a:buNone/>
+                      </a:pPr>
+                      <a:r>
                         <a:rPr lang="en-US" altLang="ko-KR" sz="1200" smtClean="0">
                           <a:solidFill>
                             <a:schemeClr val="tx1"/>
                           </a:solidFill>
                           <a:cs typeface="Arial" pitchFamily="34" charset="0"/>
                         </a:rPr>
-                        <a:t>Thêm tùy chọn Ether, Gwei</a:t>
+                        <a:t>- Owner</a:t>
+                      </a:r>
+                      <a:r>
+                        <a:rPr lang="en-US" altLang="ko-KR" sz="1200" baseline="0" smtClean="0">
+                          <a:solidFill>
+                            <a:schemeClr val="tx1"/>
+                          </a:solidFill>
+                          <a:cs typeface="Arial" pitchFamily="34" charset="0"/>
+                        </a:rPr>
+                        <a:t> Item có thể tặng Item cho người khác.</a:t>
+                      </a:r>
+                    </a:p>
+                    <a:p>
+                      <a:pPr marL="0" indent="0">
+                        <a:spcBef>
+                          <a:spcPts val="0"/>
+                        </a:spcBef>
+                        <a:spcAft>
+                          <a:spcPts val="600"/>
+                        </a:spcAft>
+                        <a:buFontTx/>
+                        <a:buNone/>
+                      </a:pPr>
+                      <a:r>
+                        <a:rPr lang="en-US" altLang="ko-KR" sz="1200" baseline="0" smtClean="0">
+                          <a:solidFill>
+                            <a:schemeClr val="tx1"/>
+                          </a:solidFill>
+                          <a:cs typeface="Arial" pitchFamily="34" charset="0"/>
+                        </a:rPr>
+                        <a:t>- Owner có thể tự kiểm soát trực tiếp giá bán, mở bán hoặc ngừng mở bán Item.</a:t>
+                      </a:r>
+                    </a:p>
+                    <a:p>
+                      <a:pPr marL="0" indent="0">
+                        <a:spcBef>
+                          <a:spcPts val="0"/>
+                        </a:spcBef>
+                        <a:spcAft>
+                          <a:spcPts val="600"/>
+                        </a:spcAft>
+                        <a:buFontTx/>
+                        <a:buChar char="-"/>
+                      </a:pPr>
+                      <a:r>
+                        <a:rPr lang="en-US" altLang="ko-KR" sz="1200" baseline="0" smtClean="0">
+                          <a:solidFill>
+                            <a:schemeClr val="tx1"/>
+                          </a:solidFill>
+                          <a:cs typeface="Arial" pitchFamily="34" charset="0"/>
+                        </a:rPr>
+                        <a:t> Thêm hóa đơn sau khi đơn hàng mua bán thành công.</a:t>
                       </a:r>
                       <a:endParaRPr lang="en-US" altLang="ko-KR" sz="1200" dirty="0">
                         <a:solidFill>
@@ -9645,7 +9833,7 @@
                   <a:tcPr anchor="ctr">
                     <a:lnL w="12700" cap="flat" cmpd="sng" algn="ctr">
                       <a:solidFill>
-                        <a:schemeClr val="accent1"/>
+                        <a:schemeClr val="tx1"/>
                       </a:solidFill>
                       <a:prstDash val="solid"/>
                       <a:round/>
@@ -9653,9 +9841,7 @@
                       <a:tailEnd type="none" w="med" len="med"/>
                     </a:lnL>
                     <a:lnR w="12700" cap="flat" cmpd="sng" algn="ctr">
-                      <a:solidFill>
-                        <a:schemeClr val="accent1"/>
-                      </a:solidFill>
+                      <a:noFill/>
                       <a:prstDash val="solid"/>
                       <a:round/>
                       <a:headEnd type="none" w="med" len="med"/>
@@ -9663,7 +9849,7 @@
                     </a:lnR>
                     <a:lnT w="12700" cap="flat" cmpd="sng" algn="ctr">
                       <a:solidFill>
-                        <a:schemeClr val="accent1"/>
+                        <a:schemeClr val="tx1"/>
                       </a:solidFill>
                       <a:prstDash val="solid"/>
                       <a:round/>
@@ -9672,13 +9858,21 @@
                     </a:lnT>
                     <a:lnB w="12700" cap="flat" cmpd="sng" algn="ctr">
                       <a:solidFill>
-                        <a:schemeClr val="accent1"/>
+                        <a:schemeClr val="tx1"/>
                       </a:solidFill>
                       <a:prstDash val="solid"/>
                       <a:round/>
                       <a:headEnd type="none" w="med" len="med"/>
                       <a:tailEnd type="none" w="med" len="med"/>
                     </a:lnB>
+                    <a:lnTlToBr w="12700" cmpd="sng">
+                      <a:noFill/>
+                      <a:prstDash val="solid"/>
+                    </a:lnTlToBr>
+                    <a:lnBlToTr w="12700" cmpd="sng">
+                      <a:noFill/>
+                      <a:prstDash val="solid"/>
+                    </a:lnBlToTr>
                   </a:tcPr>
                 </a:tc>
               </a:tr>
@@ -9688,6 +9882,7 @@
                     <a:bodyPr/>
                     <a:lstStyle/>
                     <a:p>
+                      <a:pPr algn="ctr"/>
                       <a:r>
                         <a:rPr lang="en-US" sz="1100" b="1" kern="1200" smtClean="0">
                           <a:solidFill>
@@ -9704,9 +9899,7 @@
                   </a:txBody>
                   <a:tcPr anchor="ctr">
                     <a:lnL w="12700" cap="flat" cmpd="sng" algn="ctr">
-                      <a:solidFill>
-                        <a:schemeClr val="accent1"/>
-                      </a:solidFill>
+                      <a:noFill/>
                       <a:prstDash val="solid"/>
                       <a:round/>
                       <a:headEnd type="none" w="med" len="med"/>
@@ -9714,7 +9907,7 @@
                     </a:lnL>
                     <a:lnR w="12700" cap="flat" cmpd="sng" algn="ctr">
                       <a:solidFill>
-                        <a:schemeClr val="accent1"/>
+                        <a:schemeClr val="tx1"/>
                       </a:solidFill>
                       <a:prstDash val="solid"/>
                       <a:round/>
@@ -9723,7 +9916,7 @@
                     </a:lnR>
                     <a:lnT w="12700" cap="flat" cmpd="sng" algn="ctr">
                       <a:solidFill>
-                        <a:schemeClr val="accent1"/>
+                        <a:schemeClr val="tx1"/>
                       </a:solidFill>
                       <a:prstDash val="solid"/>
                       <a:round/>
@@ -9732,13 +9925,21 @@
                     </a:lnT>
                     <a:lnB w="12700" cap="flat" cmpd="sng" algn="ctr">
                       <a:solidFill>
-                        <a:schemeClr val="accent1"/>
+                        <a:schemeClr val="tx1"/>
                       </a:solidFill>
                       <a:prstDash val="solid"/>
                       <a:round/>
                       <a:headEnd type="none" w="med" len="med"/>
                       <a:tailEnd type="none" w="med" len="med"/>
                     </a:lnB>
+                    <a:lnTlToBr w="12700" cmpd="sng">
+                      <a:noFill/>
+                      <a:prstDash val="solid"/>
+                    </a:lnTlToBr>
+                    <a:lnBlToTr w="12700" cmpd="sng">
+                      <a:noFill/>
+                      <a:prstDash val="solid"/>
+                    </a:lnBlToTr>
                   </a:tcPr>
                 </a:tc>
                 <a:tc>
@@ -9746,13 +9947,23 @@
                     <a:bodyPr/>
                     <a:lstStyle/>
                     <a:p>
+                      <a:pPr marL="0" indent="0">
+                        <a:spcBef>
+                          <a:spcPts val="0"/>
+                        </a:spcBef>
+                        <a:spcAft>
+                          <a:spcPts val="600"/>
+                        </a:spcAft>
+                        <a:buFontTx/>
+                        <a:buNone/>
+                      </a:pPr>
                       <a:r>
                         <a:rPr lang="en-US" sz="1200" smtClean="0">
                           <a:solidFill>
                             <a:schemeClr val="tx1"/>
                           </a:solidFill>
                         </a:rPr>
-                        <a:t>Quản</a:t>
+                        <a:t>- Xử</a:t>
                       </a:r>
                       <a:r>
                         <a:rPr lang="en-US" sz="1200" baseline="0" smtClean="0">
@@ -9760,19 +9971,54 @@
                             <a:schemeClr val="tx1"/>
                           </a:solidFill>
                         </a:rPr>
-                        <a:t> lý bằng bảng</a:t>
+                        <a:t> lý itemIndex bằng thư viện Counters của OpenZeppenlin.</a:t>
                       </a:r>
-                      <a:endParaRPr lang="en-US" sz="1200">
-                        <a:solidFill>
-                          <a:schemeClr val="tx1"/>
-                        </a:solidFill>
-                      </a:endParaRPr>
+                    </a:p>
+                    <a:p>
+                      <a:pPr marL="0" indent="0">
+                        <a:spcBef>
+                          <a:spcPts val="0"/>
+                        </a:spcBef>
+                        <a:spcAft>
+                          <a:spcPts val="600"/>
+                        </a:spcAft>
+                        <a:buFontTx/>
+                        <a:buNone/>
+                      </a:pPr>
+                      <a:r>
+                        <a:rPr lang="en-US" sz="1200" baseline="0" smtClean="0">
+                          <a:solidFill>
+                            <a:schemeClr val="tx1"/>
+                          </a:solidFill>
+                        </a:rPr>
+                        <a:t>- Kiểm soát việc mua bán Item, thêm Order để theo dõi vận đơn sau khi thanh toán.</a:t>
+                      </a:r>
+                    </a:p>
+                    <a:p>
+                      <a:pPr marL="0" indent="0">
+                        <a:spcBef>
+                          <a:spcPts val="0"/>
+                        </a:spcBef>
+                        <a:spcAft>
+                          <a:spcPts val="600"/>
+                        </a:spcAft>
+                        <a:buFontTx/>
+                        <a:buNone/>
+                      </a:pPr>
+                      <a:r>
+                        <a:rPr lang="en-US" sz="1200" baseline="0" smtClean="0">
+                          <a:solidFill>
+                            <a:schemeClr val="tx1"/>
+                          </a:solidFill>
+                        </a:rPr>
+                        <a:t>- Người mua Item sau khi nhận hàng thành công có thể bán lại Item đó cho người khác.</a:t>
+                      </a:r>
                     </a:p>
                   </a:txBody>
                   <a:tcPr anchor="ctr">
                     <a:lnL w="12700" cap="flat" cmpd="sng" algn="ctr">
                       <a:solidFill>
-                        <a:schemeClr val="accent1"/>
+                        <a:schemeClr val="tx1"/>
                       </a:solidFill>
                       <a:prstDash val="solid"/>
                       <a:round/>
@@ -9780,9 +10026,7 @@
                       <a:tailEnd type="none" w="med" len="med"/>
                     </a:lnL>
                     <a:lnR w="12700" cap="flat" cmpd="sng" algn="ctr">
-                      <a:solidFill>
-                        <a:schemeClr val="accent1"/>
-                      </a:solidFill>
+                      <a:noFill/>
                       <a:prstDash val="solid"/>
                       <a:round/>
                       <a:headEnd type="none" w="med" len="med"/>
@@ -9790,7 +10034,7 @@
                     </a:lnR>
                     <a:lnT w="12700" cap="flat" cmpd="sng" algn="ctr">
                       <a:solidFill>
-                        <a:schemeClr val="accent1"/>
+                        <a:schemeClr val="tx1"/>
                       </a:solidFill>
                       <a:prstDash val="solid"/>
                       <a:round/>
@@ -9799,13 +10043,21 @@
                     </a:lnT>
                     <a:lnB w="12700" cap="flat" cmpd="sng" algn="ctr">
                       <a:solidFill>
-                        <a:schemeClr val="accent1"/>
+                        <a:schemeClr val="tx1"/>
                       </a:solidFill>
                       <a:prstDash val="solid"/>
                       <a:round/>
                       <a:headEnd type="none" w="med" len="med"/>
                       <a:tailEnd type="none" w="med" len="med"/>
                     </a:lnB>
+                    <a:lnTlToBr w="12700" cmpd="sng">
+                      <a:noFill/>
+                      <a:prstDash val="solid"/>
+                    </a:lnTlToBr>
+                    <a:lnBlToTr w="12700" cmpd="sng">
+                      <a:noFill/>
+                      <a:prstDash val="solid"/>
+                    </a:lnBlToTr>
                   </a:tcPr>
                 </a:tc>
               </a:tr>
@@ -9815,6 +10067,7 @@
                     <a:bodyPr/>
                     <a:lstStyle/>
                     <a:p>
+                      <a:pPr algn="ctr"/>
                       <a:r>
                         <a:rPr lang="en-US" sz="1100" b="1" kern="1200" smtClean="0">
                           <a:solidFill>
@@ -9825,15 +10078,22 @@
                           <a:ea typeface="+mn-ea"/>
                           <a:cs typeface="+mn-cs"/>
                         </a:rPr>
-                        <a:t>Payment</a:t>
+                        <a:t>Order</a:t>
                       </a:r>
+                      <a:endParaRPr lang="en-US" sz="1100" b="1" kern="1200" smtClean="0">
+                        <a:solidFill>
+                          <a:schemeClr val="tx1"/>
+                        </a:solidFill>
+                        <a:effectLst/>
+                        <a:latin typeface="JetBrains Mono" panose="020B0509020102050004" pitchFamily="49" charset="0"/>
+                        <a:ea typeface="+mn-ea"/>
+                        <a:cs typeface="+mn-cs"/>
+                      </a:endParaRPr>
                     </a:p>
                   </a:txBody>
                   <a:tcPr anchor="ctr">
                     <a:lnL w="12700" cap="flat" cmpd="sng" algn="ctr">
-                      <a:solidFill>
-                        <a:schemeClr val="accent1"/>
-                      </a:solidFill>
+                      <a:noFill/>
                       <a:prstDash val="solid"/>
                       <a:round/>
                       <a:headEnd type="none" w="med" len="med"/>
@@ -9841,7 +10101,7 @@
                     </a:lnL>
                     <a:lnR w="12700" cap="flat" cmpd="sng" algn="ctr">
                       <a:solidFill>
-                        <a:schemeClr val="accent1"/>
+                        <a:schemeClr val="tx1"/>
                       </a:solidFill>
                       <a:prstDash val="solid"/>
                       <a:round/>
@@ -9850,7 +10110,7 @@
                     </a:lnR>
                     <a:lnT w="12700" cap="flat" cmpd="sng" algn="ctr">
                       <a:solidFill>
-                        <a:schemeClr val="accent1"/>
+                        <a:schemeClr val="tx1"/>
                       </a:solidFill>
                       <a:prstDash val="solid"/>
                       <a:round/>
@@ -9858,14 +10118,20 @@
                       <a:tailEnd type="none" w="med" len="med"/>
                     </a:lnT>
                     <a:lnB w="12700" cap="flat" cmpd="sng" algn="ctr">
-                      <a:solidFill>
-                        <a:schemeClr val="accent1"/>
-                      </a:solidFill>
+                      <a:noFill/>
                       <a:prstDash val="solid"/>
                       <a:round/>
                       <a:headEnd type="none" w="med" len="med"/>
                       <a:tailEnd type="none" w="med" len="med"/>
                     </a:lnB>
+                    <a:lnTlToBr w="12700" cmpd="sng">
+                      <a:noFill/>
+                      <a:prstDash val="solid"/>
+                    </a:lnTlToBr>
+                    <a:lnBlToTr w="12700" cmpd="sng">
+                      <a:noFill/>
+                      <a:prstDash val="solid"/>
+                    </a:lnBlToTr>
                   </a:tcPr>
                 </a:tc>
                 <a:tc>
@@ -9873,13 +10139,21 @@
                     <a:bodyPr/>
                     <a:lstStyle/>
                     <a:p>
+                      <a:pPr>
+                        <a:spcBef>
+                          <a:spcPts val="0"/>
+                        </a:spcBef>
+                        <a:spcAft>
+                          <a:spcPts val="600"/>
+                        </a:spcAft>
+                      </a:pPr>
                       <a:r>
                         <a:rPr lang="en-US" sz="1200" smtClean="0">
                           <a:solidFill>
                             <a:schemeClr val="tx1"/>
                           </a:solidFill>
                         </a:rPr>
-                        <a:t>Mua hằng</a:t>
+                        <a:t>- Xử</a:t>
                       </a:r>
                       <a:r>
                         <a:rPr lang="en-US" sz="1200" baseline="0" smtClean="0">
@@ -9887,19 +10161,125 @@
                             <a:schemeClr val="tx1"/>
                           </a:solidFill>
                         </a:rPr>
-                        <a:t> bằng 1 nút nhấn</a:t>
+                        <a:t> lý thời gian bằng thư viện Timers của OpenZeppenlin.</a:t>
                       </a:r>
-                      <a:endParaRPr lang="en-US" sz="1200">
-                        <a:solidFill>
-                          <a:schemeClr val="tx1"/>
-                        </a:solidFill>
-                      </a:endParaRPr>
+                    </a:p>
+                    <a:p>
+                      <a:pPr>
+                        <a:spcBef>
+                          <a:spcPts val="0"/>
+                        </a:spcBef>
+                        <a:spcAft>
+                          <a:spcPts val="600"/>
+                        </a:spcAft>
+                      </a:pPr>
+                      <a:r>
+                        <a:rPr lang="en-US" sz="1200" baseline="0" smtClean="0">
+                          <a:solidFill>
+                            <a:schemeClr val="tx1"/>
+                          </a:solidFill>
+                        </a:rPr>
+                        <a:t>- Nắm giữ Ether của người mua và chỉ trả cho người bán sau khi nhận hàng thành công.</a:t>
+                      </a:r>
+                    </a:p>
+                    <a:p>
+                      <a:pPr>
+                        <a:spcBef>
+                          <a:spcPts val="0"/>
+                        </a:spcBef>
+                        <a:spcAft>
+                          <a:spcPts val="600"/>
+                        </a:spcAft>
+                      </a:pPr>
+                      <a:r>
+                        <a:rPr lang="en-US" sz="1200" smtClean="0">
+                          <a:solidFill>
+                            <a:schemeClr val="tx1"/>
+                          </a:solidFill>
+                        </a:rPr>
+                        <a:t>- Người</a:t>
+                      </a:r>
+                      <a:r>
+                        <a:rPr lang="en-US" sz="1200" baseline="0" smtClean="0">
+                          <a:solidFill>
+                            <a:schemeClr val="tx1"/>
+                          </a:solidFill>
+                        </a:rPr>
+                        <a:t> bán hàng cần xác nhận giao dịch trước khi hết thời gian cam kết.</a:t>
+                      </a:r>
+                    </a:p>
+                    <a:p>
+                      <a:pPr>
+                        <a:spcBef>
+                          <a:spcPts val="0"/>
+                        </a:spcBef>
+                        <a:spcAft>
+                          <a:spcPts val="600"/>
+                        </a:spcAft>
+                      </a:pPr>
+                      <a:r>
+                        <a:rPr lang="en-US" sz="1200" smtClean="0">
+                          <a:solidFill>
+                            <a:schemeClr val="tx1"/>
+                          </a:solidFill>
+                        </a:rPr>
+                        <a:t>-</a:t>
+                      </a:r>
+                      <a:r>
+                        <a:rPr lang="en-US" sz="1200" baseline="0" smtClean="0">
+                          <a:solidFill>
+                            <a:schemeClr val="tx1"/>
+                          </a:solidFill>
+                        </a:rPr>
+                        <a:t> Người bán hàng gửi hàng đến nơi người nhận trước khi hết thời gian cam kết.</a:t>
+                      </a:r>
+                      <a:br>
+                        <a:rPr lang="en-US" sz="1200" baseline="0" smtClean="0">
+                          <a:solidFill>
+                            <a:schemeClr val="tx1"/>
+                          </a:solidFill>
+                        </a:rPr>
+                      </a:br>
+                      <a:r>
+                        <a:rPr lang="en-US" sz="1200" baseline="0" smtClean="0">
+                          <a:solidFill>
+                            <a:schemeClr val="tx1"/>
+                          </a:solidFill>
+                        </a:rPr>
+                        <a:t>- Người mua hàng xác nhận đã nhận hàng để hoàn tất quá trình.</a:t>
+                      </a:r>
+                    </a:p>
+                    <a:p>
+                      <a:pPr>
+                        <a:spcBef>
+                          <a:spcPts val="0"/>
+                        </a:spcBef>
+                        <a:spcAft>
+                          <a:spcPts val="600"/>
+                        </a:spcAft>
+                      </a:pPr>
+                      <a:r>
+                        <a:rPr lang="en-US" sz="1200" smtClean="0">
+                          <a:solidFill>
+                            <a:schemeClr val="tx1"/>
+                          </a:solidFill>
+                        </a:rPr>
+                        <a:t>- Người</a:t>
+                      </a:r>
+                      <a:r>
+                        <a:rPr lang="en-US" sz="1200" baseline="0" smtClean="0">
+                          <a:solidFill>
+                            <a:schemeClr val="tx1"/>
+                          </a:solidFill>
+                        </a:rPr>
+                        <a:t> nhận hàng có thể hủy giao dịch trước khi người bán xác nhận hoặc sau khi hết thời gian cam kết, tiền sẽ trả về cho người mua hàng.</a:t>
+                      </a:r>
                     </a:p>
                   </a:txBody>
                   <a:tcPr anchor="ctr">
                     <a:lnL w="12700" cap="flat" cmpd="sng" algn="ctr">
                       <a:solidFill>
-                        <a:schemeClr val="accent1"/>
+                        <a:schemeClr val="tx1"/>
                       </a:solidFill>
                       <a:prstDash val="solid"/>
                       <a:round/>
@@ -9907,9 +10287,7 @@
                       <a:tailEnd type="none" w="med" len="med"/>
                     </a:lnL>
                     <a:lnR w="12700" cap="flat" cmpd="sng" algn="ctr">
-                      <a:solidFill>
-                        <a:schemeClr val="accent1"/>
-                      </a:solidFill>
+                      <a:noFill/>
                       <a:prstDash val="solid"/>
                       <a:round/>
                       <a:headEnd type="none" w="med" len="med"/>
@@ -9917,7 +10295,7 @@
                     </a:lnR>
                     <a:lnT w="12700" cap="flat" cmpd="sng" algn="ctr">
                       <a:solidFill>
-                        <a:schemeClr val="accent1"/>
+                        <a:schemeClr val="tx1"/>
                       </a:solidFill>
                       <a:prstDash val="solid"/>
                       <a:round/>
@@ -9925,14 +10303,20 @@
                       <a:tailEnd type="none" w="med" len="med"/>
                     </a:lnT>
                     <a:lnB w="12700" cap="flat" cmpd="sng" algn="ctr">
-                      <a:solidFill>
-                        <a:schemeClr val="accent1"/>
-                      </a:solidFill>
+                      <a:noFill/>
                       <a:prstDash val="solid"/>
                       <a:round/>
                       <a:headEnd type="none" w="med" len="med"/>
                       <a:tailEnd type="none" w="med" len="med"/>
                     </a:lnB>
+                    <a:lnTlToBr w="12700" cmpd="sng">
+                      <a:noFill/>
+                      <a:prstDash val="solid"/>
+                    </a:lnTlToBr>
+                    <a:lnBlToTr w="12700" cmpd="sng">
+                      <a:noFill/>
+                      <a:prstDash val="solid"/>
+                    </a:lnBlToTr>
                   </a:tcPr>
                 </a:tc>
               </a:tr>

</xml_diff>

<commit_message>
add env file to connect to db
</commit_message>
<xml_diff>
--- a/Blockchain1.pptx
+++ b/Blockchain1.pptx
@@ -211,7 +211,7 @@
           <a:p>
             <a:fld id="{FA90EC1C-D305-4D94-A551-D43A0AC1DF1E}" type="datetimeFigureOut">
               <a:rPr lang="en-US" smtClean="0"/>
-              <a:t>14 Feb 2022</a:t>
+              <a:t>22 Feb 2022</a:t>
             </a:fld>
             <a:endParaRPr lang="en-US"/>
           </a:p>
@@ -9010,42 +9010,6 @@
             </a:bodyPr>
             <a:lstStyle/>
             <a:p>
-              <a:r>
-                <a:rPr lang="en-US" altLang="ko-KR" sz="1000" smtClean="0">
-                  <a:solidFill>
-                    <a:schemeClr val="tx1">
-                      <a:lumMod val="75000"/>
-                      <a:lumOff val="25000"/>
-                    </a:schemeClr>
-                  </a:solidFill>
-                  <a:cs typeface="Arial" pitchFamily="34" charset="0"/>
-                </a:rPr>
-                <a:t>Ai cũng có thể đăng bán và </a:t>
-              </a:r>
-              <a:r>
-                <a:rPr lang="vi-VN" altLang="ko-KR" sz="1000" smtClean="0">
-                  <a:solidFill>
-                    <a:schemeClr val="tx1">
-                      <a:lumMod val="75000"/>
-                      <a:lumOff val="25000"/>
-                    </a:schemeClr>
-                  </a:solidFill>
-                  <a:cs typeface="Arial" pitchFamily="34" charset="0"/>
-                </a:rPr>
-                <a:t>mua </a:t>
-              </a:r>
-              <a:r>
-                <a:rPr lang="vi-VN" altLang="ko-KR" sz="1000">
-                  <a:solidFill>
-                    <a:schemeClr val="tx1">
-                      <a:lumMod val="75000"/>
-                      <a:lumOff val="25000"/>
-                    </a:schemeClr>
-                  </a:solidFill>
-                  <a:cs typeface="Arial" pitchFamily="34" charset="0"/>
-                </a:rPr>
-                <a:t>hàng, tiền trả về người bán</a:t>
-              </a:r>
               <a:endParaRPr lang="en-US" altLang="ko-KR" sz="1000" smtClean="0">
                 <a:solidFill>
                   <a:schemeClr val="tx1">
@@ -9067,7 +9031,7 @@
           <p:spPr>
             <a:xfrm>
               <a:off x="4664273" y="1245639"/>
-              <a:ext cx="3646907" cy="307777"/>
+              <a:ext cx="3646907" cy="523220"/>
             </a:xfrm>
             <a:prstGeom prst="rect">
               <a:avLst/>
@@ -9081,7 +9045,7 @@
             <a:lstStyle/>
             <a:p>
               <a:r>
-                <a:rPr lang="en-US" altLang="ko-KR" sz="1400" b="1" smtClean="0">
+                <a:rPr lang="en-US" altLang="ko-KR" sz="1400" b="1">
                   <a:solidFill>
                     <a:schemeClr val="tx1">
                       <a:lumMod val="75000"/>
@@ -9090,99 +9054,10 @@
                   </a:solidFill>
                   <a:cs typeface="Arial" pitchFamily="34" charset="0"/>
                 </a:rPr>
-                <a:t>ItemManager </a:t>
+                <a:t>Ai cũng có thể đăng bán và </a:t>
               </a:r>
-              <a:endParaRPr lang="ko-KR" altLang="en-US" sz="1400" b="1" dirty="0">
-                <a:solidFill>
-                  <a:schemeClr val="tx1">
-                    <a:lumMod val="75000"/>
-                    <a:lumOff val="25000"/>
-                  </a:schemeClr>
-                </a:solidFill>
-                <a:cs typeface="Arial" pitchFamily="34" charset="0"/>
-              </a:endParaRPr>
-            </a:p>
-          </p:txBody>
-        </p:sp>
-      </p:grpSp>
-      <p:grpSp>
-        <p:nvGrpSpPr>
-          <p:cNvPr id="49" name="Group 48"/>
-          <p:cNvGrpSpPr/>
-          <p:nvPr/>
-        </p:nvGrpSpPr>
-        <p:grpSpPr>
-          <a:xfrm>
-            <a:off x="4083858" y="2909459"/>
-            <a:ext cx="4254256" cy="525829"/>
-            <a:chOff x="4581609" y="1248519"/>
-            <a:chExt cx="3753774" cy="525829"/>
-          </a:xfrm>
-        </p:grpSpPr>
-        <p:sp>
-          <p:nvSpPr>
-            <p:cNvPr id="50" name="TextBox 49"/>
-            <p:cNvSpPr txBox="1"/>
-            <p:nvPr/>
-          </p:nvSpPr>
-          <p:spPr>
-            <a:xfrm>
-              <a:off x="4581609" y="1528127"/>
-              <a:ext cx="3716924" cy="246221"/>
-            </a:xfrm>
-            <a:prstGeom prst="rect">
-              <a:avLst/>
-            </a:prstGeom>
-            <a:noFill/>
-          </p:spPr>
-          <p:txBody>
-            <a:bodyPr wrap="square" rtlCol="0">
-              <a:spAutoFit/>
-            </a:bodyPr>
-            <a:lstStyle/>
-            <a:p>
               <a:r>
-                <a:rPr lang="en-US" altLang="ko-KR" sz="1000" smtClean="0">
-                  <a:solidFill>
-                    <a:schemeClr val="accent1"/>
-                  </a:solidFill>
-                  <a:cs typeface="Arial" pitchFamily="34" charset="0"/>
-                </a:rPr>
-                <a:t>Owner có nhiều quyền quản lý Item hơn, thêm hóa đơn sau khi bán </a:t>
-              </a:r>
-              <a:endParaRPr lang="en-US" altLang="ko-KR" sz="1000" dirty="0">
-                <a:solidFill>
-                  <a:schemeClr val="accent1"/>
-                </a:solidFill>
-                <a:cs typeface="Arial" pitchFamily="34" charset="0"/>
-              </a:endParaRPr>
-            </a:p>
-          </p:txBody>
-        </p:sp>
-        <p:sp>
-          <p:nvSpPr>
-            <p:cNvPr id="51" name="TextBox 50"/>
-            <p:cNvSpPr txBox="1"/>
-            <p:nvPr/>
-          </p:nvSpPr>
-          <p:spPr>
-            <a:xfrm>
-              <a:off x="4676750" y="1248519"/>
-              <a:ext cx="3658633" cy="307777"/>
-            </a:xfrm>
-            <a:prstGeom prst="rect">
-              <a:avLst/>
-            </a:prstGeom>
-            <a:noFill/>
-          </p:spPr>
-          <p:txBody>
-            <a:bodyPr wrap="square" rtlCol="0">
-              <a:spAutoFit/>
-            </a:bodyPr>
-            <a:lstStyle/>
-            <a:p>
-              <a:r>
-                <a:rPr lang="en-US" altLang="ko-KR" sz="1400" b="1" smtClean="0">
+                <a:rPr lang="vi-VN" altLang="ko-KR" sz="1400" b="1">
                   <a:solidFill>
                     <a:schemeClr val="tx1">
                       <a:lumMod val="75000"/>
@@ -9191,113 +9066,9 @@
                   </a:solidFill>
                   <a:cs typeface="Arial" pitchFamily="34" charset="0"/>
                 </a:rPr>
-                <a:t>Item</a:t>
+                <a:t>mua hàng, tiền trả về người bán</a:t>
               </a:r>
-              <a:endParaRPr lang="ko-KR" altLang="en-US" sz="1200" b="1" dirty="0">
-                <a:solidFill>
-                  <a:schemeClr val="tx1">
-                    <a:lumMod val="75000"/>
-                    <a:lumOff val="25000"/>
-                  </a:schemeClr>
-                </a:solidFill>
-                <a:cs typeface="Arial" pitchFamily="34" charset="0"/>
-              </a:endParaRPr>
-            </a:p>
-          </p:txBody>
-        </p:sp>
-      </p:grpSp>
-      <p:grpSp>
-        <p:nvGrpSpPr>
-          <p:cNvPr id="52" name="Group 51"/>
-          <p:cNvGrpSpPr/>
-          <p:nvPr/>
-        </p:nvGrpSpPr>
-        <p:grpSpPr>
-          <a:xfrm>
-            <a:off x="3753185" y="3816227"/>
-            <a:ext cx="4294738" cy="519237"/>
-            <a:chOff x="4608001" y="1243740"/>
-            <a:chExt cx="3787604" cy="519237"/>
-          </a:xfrm>
-        </p:grpSpPr>
-        <p:sp>
-          <p:nvSpPr>
-            <p:cNvPr id="53" name="TextBox 52"/>
-            <p:cNvSpPr txBox="1"/>
-            <p:nvPr/>
-          </p:nvSpPr>
-          <p:spPr>
-            <a:xfrm>
-              <a:off x="4608001" y="1516756"/>
-              <a:ext cx="3787604" cy="246221"/>
-            </a:xfrm>
-            <a:prstGeom prst="rect">
-              <a:avLst/>
-            </a:prstGeom>
-            <a:noFill/>
-          </p:spPr>
-          <p:txBody>
-            <a:bodyPr wrap="square" rtlCol="0">
-              <a:spAutoFit/>
-            </a:bodyPr>
-            <a:lstStyle/>
-            <a:p>
-              <a:r>
-                <a:rPr lang="en-US" altLang="ko-KR" sz="1000" smtClean="0">
-                  <a:solidFill>
-                    <a:schemeClr val="tx1">
-                      <a:lumMod val="75000"/>
-                      <a:lumOff val="25000"/>
-                    </a:schemeClr>
-                  </a:solidFill>
-                  <a:cs typeface="Arial" pitchFamily="34" charset="0"/>
-                </a:rPr>
-                <a:t>Vận đơn của Item, quản lý vận chuyển, thời gian thực hiện, hoàn tiền </a:t>
-              </a:r>
-              <a:endParaRPr lang="en-US" altLang="ko-KR" sz="1000" dirty="0">
-                <a:solidFill>
-                  <a:schemeClr val="accent1"/>
-                </a:solidFill>
-                <a:cs typeface="Arial" pitchFamily="34" charset="0"/>
-              </a:endParaRPr>
-            </a:p>
-          </p:txBody>
-        </p:sp>
-        <p:sp>
-          <p:nvSpPr>
-            <p:cNvPr id="54" name="TextBox 53"/>
-            <p:cNvSpPr txBox="1"/>
-            <p:nvPr/>
-          </p:nvSpPr>
-          <p:spPr>
-            <a:xfrm>
-              <a:off x="4673301" y="1243740"/>
-              <a:ext cx="3657003" cy="307777"/>
-            </a:xfrm>
-            <a:prstGeom prst="rect">
-              <a:avLst/>
-            </a:prstGeom>
-            <a:noFill/>
-          </p:spPr>
-          <p:txBody>
-            <a:bodyPr wrap="square" rtlCol="0">
-              <a:spAutoFit/>
-            </a:bodyPr>
-            <a:lstStyle/>
-            <a:p>
-              <a:r>
-                <a:rPr lang="en-US" altLang="ko-KR" sz="1400" b="1" smtClean="0">
-                  <a:solidFill>
-                    <a:schemeClr val="tx1">
-                      <a:lumMod val="75000"/>
-                      <a:lumOff val="25000"/>
-                    </a:schemeClr>
-                  </a:solidFill>
-                  <a:cs typeface="Arial" pitchFamily="34" charset="0"/>
-                </a:rPr>
-                <a:t>Order</a:t>
-              </a:r>
-              <a:endParaRPr lang="ko-KR" altLang="en-US" sz="1400" b="1" dirty="0">
+              <a:endParaRPr lang="en-US" altLang="ko-KR" sz="1400" b="1">
                 <a:solidFill>
                   <a:schemeClr val="tx1">
                     <a:lumMod val="75000"/>
@@ -9312,14 +9083,14 @@
       </p:grpSp>
       <p:sp>
         <p:nvSpPr>
-          <p:cNvPr id="6" name="Hộp Văn bản 5"/>
+          <p:cNvPr id="51" name="TextBox 50"/>
           <p:cNvSpPr txBox="1"/>
           <p:nvPr/>
         </p:nvSpPr>
         <p:spPr>
           <a:xfrm>
-            <a:off x="4649099" y="1204434"/>
-            <a:ext cx="3166563" cy="307777"/>
+            <a:off x="4191684" y="2909459"/>
+            <a:ext cx="4146430" cy="523220"/>
           </a:xfrm>
           <a:prstGeom prst="rect">
             <a:avLst/>
@@ -9333,53 +9104,167 @@
           <a:lstStyle/>
           <a:p>
             <a:r>
-              <a:rPr lang="en-US" sz="1400" i="1" u="sng" smtClean="0">
+              <a:rPr lang="en-US" altLang="ko-KR" sz="1400" b="1" smtClean="0">
                 <a:solidFill>
-                  <a:schemeClr val="accent4">
-                    <a:lumMod val="40000"/>
-                    <a:lumOff val="60000"/>
+                  <a:schemeClr val="tx1">
+                    <a:lumMod val="75000"/>
+                    <a:lumOff val="25000"/>
                   </a:schemeClr>
                 </a:solidFill>
-                <a:latin typeface="Segoe UI Semibold" panose="020B0702040204020203" pitchFamily="34" charset="0"/>
-                <a:cs typeface="Segoe UI Semibold" panose="020B0702040204020203" pitchFamily="34" charset="0"/>
+                <a:cs typeface="Arial" pitchFamily="34" charset="0"/>
               </a:rPr>
-              <a:t>_</a:t>
+              <a:t>Thêm trang q</a:t>
             </a:r>
             <a:r>
-              <a:rPr lang="en-US" sz="1400" i="1" u="sng">
+              <a:rPr lang="vi-VN" altLang="ko-KR" sz="1400" b="1" smtClean="0">
                 <a:solidFill>
-                  <a:schemeClr val="accent4">
-                    <a:lumMod val="40000"/>
-                    <a:lumOff val="60000"/>
+                  <a:schemeClr val="tx1">
+                    <a:lumMod val="75000"/>
+                    <a:lumOff val="25000"/>
                   </a:schemeClr>
                 </a:solidFill>
-                <a:latin typeface="Segoe UI Semibold" panose="020B0702040204020203" pitchFamily="34" charset="0"/>
-                <a:cs typeface="Segoe UI Semibold" panose="020B0702040204020203" pitchFamily="34" charset="0"/>
+                <a:cs typeface="Arial" pitchFamily="34" charset="0"/>
               </a:rPr>
-              <a:t>s</a:t>
+              <a:t>uản </a:t>
             </a:r>
             <a:r>
-              <a:rPr lang="en-US" sz="1400" i="1" u="sng" smtClean="0">
+              <a:rPr lang="vi-VN" altLang="ko-KR" sz="1400" b="1">
                 <a:solidFill>
-                  <a:schemeClr val="accent4">
-                    <a:lumMod val="40000"/>
-                    <a:lumOff val="60000"/>
+                  <a:schemeClr val="tx1">
+                    <a:lumMod val="75000"/>
+                    <a:lumOff val="25000"/>
                   </a:schemeClr>
                 </a:solidFill>
-                <a:latin typeface="Segoe UI Semibold" panose="020B0702040204020203" pitchFamily="34" charset="0"/>
-                <a:cs typeface="Segoe UI Semibold" panose="020B0702040204020203" pitchFamily="34" charset="0"/>
+                <a:cs typeface="Arial" pitchFamily="34" charset="0"/>
               </a:rPr>
-              <a:t>mart contract only_</a:t>
+              <a:t>sản phẩm, hóa </a:t>
             </a:r>
-            <a:endParaRPr lang="en-US" sz="1400" i="1" u="sng">
+            <a:r>
+              <a:rPr lang="vi-VN" altLang="ko-KR" sz="1400" b="1">
+                <a:solidFill>
+                  <a:schemeClr val="tx1">
+                    <a:lumMod val="75000"/>
+                    <a:lumOff val="25000"/>
+                  </a:schemeClr>
+                </a:solidFill>
+                <a:cs typeface="Arial" pitchFamily="34" charset="0"/>
+              </a:rPr>
+              <a:t>đơn </a:t>
+            </a:r>
+            <a:r>
+              <a:rPr lang="en-US" altLang="ko-KR" sz="1400" b="1" smtClean="0">
+                <a:solidFill>
+                  <a:schemeClr val="tx1">
+                    <a:lumMod val="75000"/>
+                    <a:lumOff val="25000"/>
+                  </a:schemeClr>
+                </a:solidFill>
+                <a:cs typeface="Arial" pitchFamily="34" charset="0"/>
+              </a:rPr>
+              <a:t>đơn </a:t>
+            </a:r>
+            <a:r>
+              <a:rPr lang="vi-VN" altLang="ko-KR" sz="1400" b="1" smtClean="0">
+                <a:solidFill>
+                  <a:schemeClr val="tx1">
+                    <a:lumMod val="75000"/>
+                    <a:lumOff val="25000"/>
+                  </a:schemeClr>
+                </a:solidFill>
+                <a:cs typeface="Arial" pitchFamily="34" charset="0"/>
+              </a:rPr>
+              <a:t>hàng </a:t>
+            </a:r>
+            <a:r>
+              <a:rPr lang="vi-VN" altLang="ko-KR" sz="1400" b="1">
+                <a:solidFill>
+                  <a:schemeClr val="tx1">
+                    <a:lumMod val="75000"/>
+                    <a:lumOff val="25000"/>
+                  </a:schemeClr>
+                </a:solidFill>
+                <a:cs typeface="Arial" pitchFamily="34" charset="0"/>
+              </a:rPr>
+              <a:t>đã mua</a:t>
+            </a:r>
+            <a:endParaRPr lang="ko-KR" altLang="en-US" sz="1200" b="1" dirty="0">
               <a:solidFill>
-                <a:schemeClr val="accent4">
-                  <a:lumMod val="40000"/>
-                  <a:lumOff val="60000"/>
+                <a:schemeClr val="tx1">
+                  <a:lumMod val="75000"/>
+                  <a:lumOff val="25000"/>
                 </a:schemeClr>
               </a:solidFill>
-              <a:latin typeface="Segoe UI Semibold" panose="020B0702040204020203" pitchFamily="34" charset="0"/>
-              <a:cs typeface="Segoe UI Semibold" panose="020B0702040204020203" pitchFamily="34" charset="0"/>
+              <a:cs typeface="Arial" pitchFamily="34" charset="0"/>
+            </a:endParaRPr>
+          </a:p>
+        </p:txBody>
+      </p:sp>
+      <p:sp>
+        <p:nvSpPr>
+          <p:cNvPr id="54" name="TextBox 53"/>
+          <p:cNvSpPr txBox="1"/>
+          <p:nvPr/>
+        </p:nvSpPr>
+        <p:spPr>
+          <a:xfrm>
+            <a:off x="3827228" y="3816227"/>
+            <a:ext cx="4146650" cy="523220"/>
+          </a:xfrm>
+          <a:prstGeom prst="rect">
+            <a:avLst/>
+          </a:prstGeom>
+          <a:noFill/>
+        </p:spPr>
+        <p:txBody>
+          <a:bodyPr wrap="square" rtlCol="0">
+            <a:spAutoFit/>
+          </a:bodyPr>
+          <a:lstStyle/>
+          <a:p>
+            <a:r>
+              <a:rPr lang="en-US" altLang="ko-KR" sz="1400" b="1" smtClean="0">
+                <a:solidFill>
+                  <a:schemeClr val="tx1">
+                    <a:lumMod val="75000"/>
+                    <a:lumOff val="25000"/>
+                  </a:schemeClr>
+                </a:solidFill>
+                <a:cs typeface="Arial" pitchFamily="34" charset="0"/>
+              </a:rPr>
+              <a:t>M</a:t>
+            </a:r>
+            <a:r>
+              <a:rPr lang="vi-VN" altLang="ko-KR" sz="1400" b="1" smtClean="0">
+                <a:solidFill>
+                  <a:schemeClr val="tx1">
+                    <a:lumMod val="75000"/>
+                    <a:lumOff val="25000"/>
+                  </a:schemeClr>
+                </a:solidFill>
+                <a:cs typeface="Arial" pitchFamily="34" charset="0"/>
+              </a:rPr>
+              <a:t>ã </a:t>
+            </a:r>
+            <a:r>
+              <a:rPr lang="vi-VN" altLang="ko-KR" sz="1400" b="1">
+                <a:solidFill>
+                  <a:schemeClr val="tx1">
+                    <a:lumMod val="75000"/>
+                    <a:lumOff val="25000"/>
+                  </a:schemeClr>
+                </a:solidFill>
+                <a:cs typeface="Arial" pitchFamily="34" charset="0"/>
+              </a:rPr>
+              <a:t>hóa dữ liệu trên database -&gt; lưu chuỗi đó vào blockchain</a:t>
+            </a:r>
+            <a:endParaRPr lang="ko-KR" altLang="en-US" sz="1400" b="1" dirty="0">
+              <a:solidFill>
+                <a:schemeClr val="tx1">
+                  <a:lumMod val="75000"/>
+                  <a:lumOff val="25000"/>
+                </a:schemeClr>
+              </a:solidFill>
+              <a:cs typeface="Arial" pitchFamily="34" charset="0"/>
             </a:endParaRPr>
           </a:p>
         </p:txBody>
@@ -9475,14 +9360,14 @@
           <p:nvPr>
             <p:extLst>
               <p:ext uri="{D42A27DB-BD31-4B8C-83A1-F6EECF244321}">
-                <p14:modId xmlns:p14="http://schemas.microsoft.com/office/powerpoint/2010/main" val="1664880761"/>
+                <p14:modId xmlns:p14="http://schemas.microsoft.com/office/powerpoint/2010/main" val="1069481248"/>
               </p:ext>
             </p:extLst>
           </p:nvPr>
         </p:nvGraphicFramePr>
         <p:xfrm>
           <a:off x="755576" y="915566"/>
-          <a:ext cx="7632848" cy="3952487"/>
+          <a:ext cx="7632848" cy="3693407"/>
         </p:xfrm>
         <a:graphic>
           <a:graphicData uri="http://schemas.openxmlformats.org/drawingml/2006/table">
@@ -9958,12 +9843,12 @@
                         <a:buNone/>
                       </a:pPr>
                       <a:r>
-                        <a:rPr lang="en-US" sz="1200" smtClean="0">
+                        <a:rPr lang="en-US" sz="1200" baseline="0" smtClean="0">
                           <a:solidFill>
                             <a:schemeClr val="tx1"/>
                           </a:solidFill>
                         </a:rPr>
-                        <a:t>- Xử</a:t>
+                        <a:t>- </a:t>
                       </a:r>
                       <a:r>
                         <a:rPr lang="en-US" sz="1200" baseline="0" smtClean="0">
@@ -9971,27 +9856,7 @@
                             <a:schemeClr val="tx1"/>
                           </a:solidFill>
                         </a:rPr>
-                        <a:t> lý itemIndex bằng thư viện Counters của OpenZeppenlin.</a:t>
-                      </a:r>
-                    </a:p>
-                    <a:p>
-                      <a:pPr marL="0" indent="0">
-                        <a:spcBef>
-                          <a:spcPts val="0"/>
-                        </a:spcBef>
-                        <a:spcAft>
-                          <a:spcPts val="600"/>
-                        </a:spcAft>
-                        <a:buFontTx/>
-                        <a:buNone/>
-                      </a:pPr>
-                      <a:r>
-                        <a:rPr lang="en-US" sz="1200" baseline="0" smtClean="0">
-                          <a:solidFill>
-                            <a:schemeClr val="tx1"/>
-                          </a:solidFill>
-                        </a:rPr>
-                        <a:t>- Kiểm soát việc mua bán Item, thêm Order để theo dõi vận đơn sau khi thanh toán.</a:t>
+                        <a:t>Kiểm soát việc mua bán Item, thêm Order để theo dõi vận đơn sau khi thanh toán.</a:t>
                       </a:r>
                     </a:p>
                     <a:p>
@@ -10080,15 +9945,6 @@
                         </a:rPr>
                         <a:t>Order</a:t>
                       </a:r>
-                      <a:endParaRPr lang="en-US" sz="1100" b="1" kern="1200" smtClean="0">
-                        <a:solidFill>
-                          <a:schemeClr val="tx1"/>
-                        </a:solidFill>
-                        <a:effectLst/>
-                        <a:latin typeface="JetBrains Mono" panose="020B0509020102050004" pitchFamily="49" charset="0"/>
-                        <a:ea typeface="+mn-ea"/>
-                        <a:cs typeface="+mn-cs"/>
-                      </a:endParaRPr>
                     </a:p>
                   </a:txBody>
                   <a:tcPr anchor="ctr">

</xml_diff>